<commit_message>
Desgin changed in Vehicle relation
</commit_message>
<xml_diff>
--- a/er/ER Diagram.pptx
+++ b/er/ER Diagram.pptx
@@ -4501,7 +4501,7 @@
         </p:nvSpPr>
         <p:spPr>
           <a:xfrm>
-            <a:off x="6256255" y="2537408"/>
+            <a:off x="6239760" y="2329835"/>
             <a:ext cx="1206631" cy="360739"/>
           </a:xfrm>
           <a:prstGeom prst="ellipse">
@@ -4556,7 +4556,7 @@
         </p:nvSpPr>
         <p:spPr>
           <a:xfrm>
-            <a:off x="6243686" y="3652202"/>
+            <a:off x="6239761" y="3188714"/>
             <a:ext cx="1206630" cy="360739"/>
           </a:xfrm>
           <a:prstGeom prst="ellipse">
@@ -4611,7 +4611,7 @@
         </p:nvSpPr>
         <p:spPr>
           <a:xfrm>
-            <a:off x="6240544" y="3094805"/>
+            <a:off x="6239761" y="2761095"/>
             <a:ext cx="1206630" cy="360739"/>
           </a:xfrm>
           <a:prstGeom prst="ellipse">
@@ -4654,10 +4654,10 @@
       </p:sp>
       <p:sp>
         <p:nvSpPr>
-          <p:cNvPr id="106" name="Oval 105">
-            <a:extLst>
-              <a:ext uri="{FF2B5EF4-FFF2-40B4-BE49-F238E27FC236}">
-                <a16:creationId xmlns:a16="http://schemas.microsoft.com/office/drawing/2014/main" id="{A942A144-4893-C417-E4E9-963343476FAF}"/>
+          <p:cNvPr id="107" name="Oval 106">
+            <a:extLst>
+              <a:ext uri="{FF2B5EF4-FFF2-40B4-BE49-F238E27FC236}">
+                <a16:creationId xmlns:a16="http://schemas.microsoft.com/office/drawing/2014/main" id="{2BEEA5AB-26D5-03C2-1264-B1423DAB9AF4}"/>
               </a:ext>
             </a:extLst>
           </p:cNvPr>
@@ -4666,7 +4666,7 @@
         </p:nvSpPr>
         <p:spPr>
           <a:xfrm>
-            <a:off x="4033100" y="2852623"/>
+            <a:off x="6238975" y="3613214"/>
             <a:ext cx="1206630" cy="360739"/>
           </a:xfrm>
           <a:prstGeom prst="ellipse">
@@ -4702,17 +4702,17 @@
             <a:pPr algn="ctr"/>
             <a:r>
               <a:rPr lang="en-US" sz="900" dirty="0"/>
-              <a:t>model_id</a:t>
-            </a:r>
-          </a:p>
-        </p:txBody>
-      </p:sp>
-      <p:sp>
-        <p:nvSpPr>
-          <p:cNvPr id="107" name="Oval 106">
-            <a:extLst>
-              <a:ext uri="{FF2B5EF4-FFF2-40B4-BE49-F238E27FC236}">
-                <a16:creationId xmlns:a16="http://schemas.microsoft.com/office/drawing/2014/main" id="{2BEEA5AB-26D5-03C2-1264-B1423DAB9AF4}"/>
+              <a:t>supplier_id</a:t>
+            </a:r>
+          </a:p>
+        </p:txBody>
+      </p:sp>
+      <p:sp>
+        <p:nvSpPr>
+          <p:cNvPr id="122" name="Diamond 121">
+            <a:extLst>
+              <a:ext uri="{FF2B5EF4-FFF2-40B4-BE49-F238E27FC236}">
+                <a16:creationId xmlns:a16="http://schemas.microsoft.com/office/drawing/2014/main" id="{0756ACF8-5BF4-30D0-CF35-D2967672EF0B}"/>
               </a:ext>
             </a:extLst>
           </p:cNvPr>
@@ -4721,62 +4721,7 @@
         </p:nvSpPr>
         <p:spPr>
           <a:xfrm>
-            <a:off x="4069238" y="3391023"/>
-            <a:ext cx="1206630" cy="360739"/>
-          </a:xfrm>
-          <a:prstGeom prst="ellipse">
-            <a:avLst/>
-          </a:prstGeom>
-          <a:solidFill>
-            <a:schemeClr val="dk1">
-              <a:alpha val="50000"/>
-            </a:schemeClr>
-          </a:solidFill>
-          <a:ln>
-            <a:noFill/>
-          </a:ln>
-        </p:spPr>
-        <p:style>
-          <a:lnRef idx="0">
-            <a:scrgbClr r="0" g="0" b="0"/>
-          </a:lnRef>
-          <a:fillRef idx="0">
-            <a:scrgbClr r="0" g="0" b="0"/>
-          </a:fillRef>
-          <a:effectRef idx="0">
-            <a:scrgbClr r="0" g="0" b="0"/>
-          </a:effectRef>
-          <a:fontRef idx="minor">
-            <a:schemeClr val="lt1"/>
-          </a:fontRef>
-        </p:style>
-        <p:txBody>
-          <a:bodyPr rtlCol="0" anchor="ctr"/>
-          <a:lstStyle/>
-          <a:p>
-            <a:pPr algn="ctr"/>
-            <a:r>
-              <a:rPr lang="en-US" sz="900" dirty="0"/>
-              <a:t>supplier_id</a:t>
-            </a:r>
-          </a:p>
-        </p:txBody>
-      </p:sp>
-      <p:sp>
-        <p:nvSpPr>
-          <p:cNvPr id="121" name="Diamond 120">
-            <a:extLst>
-              <a:ext uri="{FF2B5EF4-FFF2-40B4-BE49-F238E27FC236}">
-                <a16:creationId xmlns:a16="http://schemas.microsoft.com/office/drawing/2014/main" id="{E8351690-AEFB-AF6D-CA75-6FEFA625C099}"/>
-              </a:ext>
-            </a:extLst>
-          </p:cNvPr>
-          <p:cNvSpPr/>
-          <p:nvPr/>
-        </p:nvSpPr>
-        <p:spPr>
-          <a:xfrm>
-            <a:off x="7843098" y="2990173"/>
+            <a:off x="7711121" y="4419978"/>
             <a:ext cx="964676" cy="785411"/>
           </a:xfrm>
           <a:prstGeom prst="diamond">
@@ -4817,61 +4762,6 @@
           </a:p>
         </p:txBody>
       </p:sp>
-      <p:sp>
-        <p:nvSpPr>
-          <p:cNvPr id="122" name="Diamond 121">
-            <a:extLst>
-              <a:ext uri="{FF2B5EF4-FFF2-40B4-BE49-F238E27FC236}">
-                <a16:creationId xmlns:a16="http://schemas.microsoft.com/office/drawing/2014/main" id="{0756ACF8-5BF4-30D0-CF35-D2967672EF0B}"/>
-              </a:ext>
-            </a:extLst>
-          </p:cNvPr>
-          <p:cNvSpPr/>
-          <p:nvPr/>
-        </p:nvSpPr>
-        <p:spPr>
-          <a:xfrm>
-            <a:off x="7711121" y="4419978"/>
-            <a:ext cx="964676" cy="785411"/>
-          </a:xfrm>
-          <a:prstGeom prst="diamond">
-            <a:avLst/>
-          </a:prstGeom>
-          <a:solidFill>
-            <a:schemeClr val="accent1">
-              <a:alpha val="50000"/>
-            </a:schemeClr>
-          </a:solidFill>
-          <a:ln>
-            <a:noFill/>
-          </a:ln>
-        </p:spPr>
-        <p:style>
-          <a:lnRef idx="0">
-            <a:scrgbClr r="0" g="0" b="0"/>
-          </a:lnRef>
-          <a:fillRef idx="0">
-            <a:scrgbClr r="0" g="0" b="0"/>
-          </a:fillRef>
-          <a:effectRef idx="0">
-            <a:scrgbClr r="0" g="0" b="0"/>
-          </a:effectRef>
-          <a:fontRef idx="minor">
-            <a:schemeClr val="lt1"/>
-          </a:fontRef>
-        </p:style>
-        <p:txBody>
-          <a:bodyPr rtlCol="0" anchor="ctr"/>
-          <a:lstStyle/>
-          <a:p>
-            <a:pPr algn="ctr"/>
-            <a:r>
-              <a:rPr lang="en-US" sz="1200" dirty="0"/>
-              <a:t>Has</a:t>
-            </a:r>
-          </a:p>
-        </p:txBody>
-      </p:sp>
       <p:cxnSp>
         <p:nvCxnSpPr>
           <p:cNvPr id="129" name="Straight Connector 128">
@@ -4949,45 +4839,6 @@
       </p:cxnSp>
       <p:cxnSp>
         <p:nvCxnSpPr>
-          <p:cNvPr id="133" name="Connector: Elbow 132">
-            <a:extLst>
-              <a:ext uri="{FF2B5EF4-FFF2-40B4-BE49-F238E27FC236}">
-                <a16:creationId xmlns:a16="http://schemas.microsoft.com/office/drawing/2014/main" id="{387CC6F9-0348-0731-D64F-2C0191D70A85}"/>
-              </a:ext>
-            </a:extLst>
-          </p:cNvPr>
-          <p:cNvCxnSpPr>
-            <a:stCxn id="100" idx="3"/>
-            <a:endCxn id="121" idx="2"/>
-          </p:cNvCxnSpPr>
-          <p:nvPr/>
-        </p:nvCxnSpPr>
-        <p:spPr>
-          <a:xfrm flipV="1">
-            <a:off x="6240544" y="3775584"/>
-            <a:ext cx="2084892" cy="452765"/>
-          </a:xfrm>
-          <a:prstGeom prst="bentConnector2">
-            <a:avLst/>
-          </a:prstGeom>
-        </p:spPr>
-        <p:style>
-          <a:lnRef idx="1">
-            <a:schemeClr val="accent1"/>
-          </a:lnRef>
-          <a:fillRef idx="0">
-            <a:schemeClr val="accent1"/>
-          </a:fillRef>
-          <a:effectRef idx="0">
-            <a:schemeClr val="accent1"/>
-          </a:effectRef>
-          <a:fontRef idx="minor">
-            <a:schemeClr val="tx1"/>
-          </a:fontRef>
-        </p:style>
-      </p:cxnSp>
-      <p:cxnSp>
-        <p:nvCxnSpPr>
           <p:cNvPr id="135" name="Connector: Elbow 134">
             <a:extLst>
               <a:ext uri="{FF2B5EF4-FFF2-40B4-BE49-F238E27FC236}">
@@ -5393,8 +5244,8 @@
         </p:nvCxnSpPr>
         <p:spPr>
           <a:xfrm rot="5400000" flipH="1" flipV="1">
-            <a:off x="5342129" y="3133855"/>
-            <a:ext cx="1330202" cy="498049"/>
+            <a:off x="5230096" y="3038316"/>
+            <a:ext cx="1537775" cy="481554"/>
           </a:xfrm>
           <a:prstGeom prst="bentConnector2">
             <a:avLst/>
@@ -5432,8 +5283,8 @@
         </p:nvCxnSpPr>
         <p:spPr>
           <a:xfrm rot="5400000" flipH="1" flipV="1">
-            <a:off x="5612973" y="3420409"/>
-            <a:ext cx="772805" cy="482338"/>
+            <a:off x="5445726" y="3253946"/>
+            <a:ext cx="1106515" cy="481555"/>
           </a:xfrm>
           <a:prstGeom prst="bentConnector2">
             <a:avLst/>
@@ -5471,47 +5322,8 @@
         </p:nvCxnSpPr>
         <p:spPr>
           <a:xfrm rot="5400000" flipH="1" flipV="1">
-            <a:off x="5893242" y="3697536"/>
-            <a:ext cx="215408" cy="485480"/>
-          </a:xfrm>
-          <a:prstGeom prst="bentConnector2">
-            <a:avLst/>
-          </a:prstGeom>
-        </p:spPr>
-        <p:style>
-          <a:lnRef idx="1">
-            <a:schemeClr val="accent1"/>
-          </a:lnRef>
-          <a:fillRef idx="0">
-            <a:schemeClr val="accent1"/>
-          </a:fillRef>
-          <a:effectRef idx="0">
-            <a:schemeClr val="accent1"/>
-          </a:effectRef>
-          <a:fontRef idx="minor">
-            <a:schemeClr val="tx1"/>
-          </a:fontRef>
-        </p:style>
-      </p:cxnSp>
-      <p:cxnSp>
-        <p:nvCxnSpPr>
-          <p:cNvPr id="165" name="Connector: Elbow 164">
-            <a:extLst>
-              <a:ext uri="{FF2B5EF4-FFF2-40B4-BE49-F238E27FC236}">
-                <a16:creationId xmlns:a16="http://schemas.microsoft.com/office/drawing/2014/main" id="{878E8809-8C05-10EC-5200-72AD60634B5C}"/>
-              </a:ext>
-            </a:extLst>
-          </p:cNvPr>
-          <p:cNvCxnSpPr>
-            <a:stCxn id="100" idx="0"/>
-            <a:endCxn id="106" idx="6"/>
-          </p:cNvCxnSpPr>
-          <p:nvPr/>
-        </p:nvCxnSpPr>
-        <p:spPr>
-          <a:xfrm rot="16200000" flipV="1">
-            <a:off x="4991475" y="3281249"/>
-            <a:ext cx="1014987" cy="518476"/>
+            <a:off x="5659535" y="3467755"/>
+            <a:ext cx="678896" cy="481555"/>
           </a:xfrm>
           <a:prstGeom prst="bentConnector2">
             <a:avLst/>
@@ -5542,58 +5354,19 @@
             </a:extLst>
           </p:cNvPr>
           <p:cNvCxnSpPr>
-            <a:stCxn id="100" idx="0"/>
-            <a:endCxn id="107" idx="6"/>
+            <a:cxnSpLocks/>
+            <a:endCxn id="107" idx="2"/>
           </p:cNvCxnSpPr>
           <p:nvPr/>
         </p:nvCxnSpPr>
         <p:spPr>
-          <a:xfrm rot="16200000" flipV="1">
-            <a:off x="5278744" y="3568518"/>
-            <a:ext cx="476587" cy="482338"/>
-          </a:xfrm>
-          <a:prstGeom prst="bentConnector2">
-            <a:avLst/>
-          </a:prstGeom>
-        </p:spPr>
-        <p:style>
-          <a:lnRef idx="1">
-            <a:schemeClr val="accent1"/>
-          </a:lnRef>
-          <a:fillRef idx="0">
-            <a:schemeClr val="accent1"/>
-          </a:fillRef>
-          <a:effectRef idx="0">
-            <a:schemeClr val="accent1"/>
-          </a:effectRef>
-          <a:fontRef idx="minor">
-            <a:schemeClr val="tx1"/>
-          </a:fontRef>
-        </p:style>
-      </p:cxnSp>
-      <p:cxnSp>
-        <p:nvCxnSpPr>
-          <p:cNvPr id="172" name="Connector: Elbow 171">
-            <a:extLst>
-              <a:ext uri="{FF2B5EF4-FFF2-40B4-BE49-F238E27FC236}">
-                <a16:creationId xmlns:a16="http://schemas.microsoft.com/office/drawing/2014/main" id="{991D5B93-8C8D-6C35-4ADE-BA2CA5CFAFDA}"/>
-              </a:ext>
-            </a:extLst>
-          </p:cNvPr>
-          <p:cNvCxnSpPr>
-            <a:cxnSpLocks/>
-            <a:stCxn id="121" idx="0"/>
-          </p:cNvCxnSpPr>
-          <p:nvPr/>
-        </p:nvCxnSpPr>
-        <p:spPr>
-          <a:xfrm rot="5400000" flipH="1" flipV="1">
-            <a:off x="8317117" y="2131870"/>
-            <a:ext cx="866623" cy="849985"/>
+          <a:xfrm flipV="1">
+            <a:off x="5758206" y="3793584"/>
+            <a:ext cx="480769" cy="254396"/>
           </a:xfrm>
           <a:prstGeom prst="bentConnector3">
             <a:avLst>
-              <a:gd name="adj1" fmla="val 50000"/>
+              <a:gd name="adj1" fmla="val 981"/>
             </a:avLst>
           </a:prstGeom>
         </p:spPr>
@@ -5612,80 +5385,6 @@
           </a:fontRef>
         </p:style>
       </p:cxnSp>
-      <p:sp>
-        <p:nvSpPr>
-          <p:cNvPr id="179" name="TextBox 178">
-            <a:extLst>
-              <a:ext uri="{FF2B5EF4-FFF2-40B4-BE49-F238E27FC236}">
-                <a16:creationId xmlns:a16="http://schemas.microsoft.com/office/drawing/2014/main" id="{62EEB453-03DB-F097-FCD1-131339F6C25E}"/>
-              </a:ext>
-            </a:extLst>
-          </p:cNvPr>
-          <p:cNvSpPr txBox="1"/>
-          <p:nvPr/>
-        </p:nvSpPr>
-        <p:spPr>
-          <a:xfrm>
-            <a:off x="8613743" y="2441446"/>
-            <a:ext cx="207389" cy="230832"/>
-          </a:xfrm>
-          <a:prstGeom prst="rect">
-            <a:avLst/>
-          </a:prstGeom>
-          <a:solidFill>
-            <a:schemeClr val="bg1"/>
-          </a:solidFill>
-        </p:spPr>
-        <p:txBody>
-          <a:bodyPr wrap="square" rtlCol="0">
-            <a:spAutoFit/>
-          </a:bodyPr>
-          <a:lstStyle/>
-          <a:p>
-            <a:r>
-              <a:rPr lang="en-US" sz="900" dirty="0"/>
-              <a:t>1</a:t>
-            </a:r>
-          </a:p>
-        </p:txBody>
-      </p:sp>
-      <p:sp>
-        <p:nvSpPr>
-          <p:cNvPr id="180" name="TextBox 179">
-            <a:extLst>
-              <a:ext uri="{FF2B5EF4-FFF2-40B4-BE49-F238E27FC236}">
-                <a16:creationId xmlns:a16="http://schemas.microsoft.com/office/drawing/2014/main" id="{D242DC38-FA10-A358-6D5C-B90FBF201A21}"/>
-              </a:ext>
-            </a:extLst>
-          </p:cNvPr>
-          <p:cNvSpPr txBox="1"/>
-          <p:nvPr/>
-        </p:nvSpPr>
-        <p:spPr>
-          <a:xfrm>
-            <a:off x="7610572" y="4121055"/>
-            <a:ext cx="207389" cy="230832"/>
-          </a:xfrm>
-          <a:prstGeom prst="rect">
-            <a:avLst/>
-          </a:prstGeom>
-          <a:solidFill>
-            <a:schemeClr val="bg1"/>
-          </a:solidFill>
-        </p:spPr>
-        <p:txBody>
-          <a:bodyPr wrap="square" rtlCol="0">
-            <a:spAutoFit/>
-          </a:bodyPr>
-          <a:lstStyle/>
-          <a:p>
-            <a:r>
-              <a:rPr lang="en-US" sz="900" dirty="0"/>
-              <a:t>n</a:t>
-            </a:r>
-          </a:p>
-        </p:txBody>
-      </p:sp>
       <p:sp>
         <p:nvSpPr>
           <p:cNvPr id="181" name="TextBox 180">
@@ -7673,7 +7372,7 @@
           <a:p>
             <a:r>
               <a:rPr lang="en-US" sz="900" dirty="0"/>
-              <a:t>1</a:t>
+              <a:t>n</a:t>
             </a:r>
           </a:p>
         </p:txBody>
@@ -7747,7 +7446,7 @@
           <a:p>
             <a:r>
               <a:rPr lang="en-US" sz="900" dirty="0"/>
-              <a:t>1</a:t>
+              <a:t>n</a:t>
             </a:r>
           </a:p>
         </p:txBody>
@@ -7784,7 +7483,7 @@
           <a:p>
             <a:r>
               <a:rPr lang="en-US" sz="900" dirty="0"/>
-              <a:t>n</a:t>
+              <a:t>1</a:t>
             </a:r>
           </a:p>
         </p:txBody>
@@ -7821,7 +7520,7 @@
           <a:p>
             <a:r>
               <a:rPr lang="en-US" sz="900" dirty="0"/>
-              <a:t>n</a:t>
+              <a:t>1</a:t>
             </a:r>
           </a:p>
         </p:txBody>
@@ -7840,7 +7539,7 @@
         </p:nvSpPr>
         <p:spPr>
           <a:xfrm>
-            <a:off x="1253765" y="2879296"/>
+            <a:off x="1326039" y="2873142"/>
             <a:ext cx="207389" cy="230832"/>
           </a:xfrm>
           <a:prstGeom prst="rect">
@@ -7858,7 +7557,7 @@
           <a:p>
             <a:r>
               <a:rPr lang="en-US" sz="900" dirty="0"/>
-              <a:t>n</a:t>
+              <a:t>1</a:t>
             </a:r>
           </a:p>
         </p:txBody>

</xml_diff>